<commit_message>
update pwp with last viz
</commit_message>
<xml_diff>
--- a/Rendu/Speed-dating.pptx
+++ b/Rendu/Speed-dating.pptx
@@ -5,7 +5,7 @@
     <p:sldMasterId id="2147483725" r:id="rId1"/>
   </p:sldMasterIdLst>
   <p:notesMasterIdLst>
-    <p:notesMasterId r:id="rId15"/>
+    <p:notesMasterId r:id="rId18"/>
   </p:notesMasterIdLst>
   <p:sldIdLst>
     <p:sldId id="256" r:id="rId2"/>
@@ -20,28 +20,31 @@
     <p:sldId id="279" r:id="rId11"/>
     <p:sldId id="262" r:id="rId12"/>
     <p:sldId id="273" r:id="rId13"/>
-    <p:sldId id="259" r:id="rId14"/>
+    <p:sldId id="280" r:id="rId14"/>
+    <p:sldId id="281" r:id="rId15"/>
+    <p:sldId id="282" r:id="rId16"/>
+    <p:sldId id="259" r:id="rId17"/>
   </p:sldIdLst>
   <p:sldSz cx="9144000" cy="5143500" type="screen16x9"/>
   <p:notesSz cx="6858000" cy="9144000"/>
   <p:embeddedFontLst>
     <p:embeddedFont>
       <p:font typeface="Verdana" panose="020B0604030504040204" pitchFamily="34" charset="0"/>
-      <p:regular r:id="rId16"/>
-      <p:bold r:id="rId17"/>
-      <p:italic r:id="rId18"/>
-      <p:boldItalic r:id="rId19"/>
+      <p:regular r:id="rId19"/>
+      <p:bold r:id="rId20"/>
+      <p:italic r:id="rId21"/>
+      <p:boldItalic r:id="rId22"/>
     </p:embeddedFont>
     <p:embeddedFont>
       <p:font typeface="Wingdings 2" panose="05020102010507070707" pitchFamily="18" charset="2"/>
-      <p:regular r:id="rId20"/>
+      <p:regular r:id="rId23"/>
     </p:embeddedFont>
     <p:embeddedFont>
       <p:font typeface="Montserrat" panose="020B0604020202020204" charset="0"/>
-      <p:regular r:id="rId21"/>
-      <p:bold r:id="rId22"/>
-      <p:italic r:id="rId23"/>
-      <p:boldItalic r:id="rId24"/>
+      <p:regular r:id="rId24"/>
+      <p:bold r:id="rId25"/>
+      <p:italic r:id="rId26"/>
+      <p:boldItalic r:id="rId27"/>
     </p:embeddedFont>
   </p:embeddedFontLst>
   <p:defaultTextStyle>
@@ -1143,6 +1146,318 @@
   <p:cSld>
     <p:spTree>
       <p:nvGrpSpPr>
+        <p:cNvPr id="1" name="Shape 60"/>
+        <p:cNvGrpSpPr/>
+        <p:nvPr/>
+      </p:nvGrpSpPr>
+      <p:grpSpPr>
+        <a:xfrm>
+          <a:off x="0" y="0"/>
+          <a:ext cx="0" cy="0"/>
+          <a:chOff x="0" y="0"/>
+          <a:chExt cx="0" cy="0"/>
+        </a:xfrm>
+      </p:grpSpPr>
+      <p:sp>
+        <p:nvSpPr>
+          <p:cNvPr id="61" name="Google Shape;61;g3bc3b886ea_0_1:notes"/>
+          <p:cNvSpPr>
+            <a:spLocks noGrp="1" noRot="1" noChangeAspect="1"/>
+          </p:cNvSpPr>
+          <p:nvPr>
+            <p:ph type="sldImg" idx="2"/>
+          </p:nvPr>
+        </p:nvSpPr>
+        <p:spPr>
+          <a:xfrm>
+            <a:off x="381000" y="685800"/>
+            <a:ext cx="6096000" cy="3429000"/>
+          </a:xfrm>
+          <a:custGeom>
+            <a:avLst/>
+            <a:gdLst/>
+            <a:ahLst/>
+            <a:cxnLst/>
+            <a:rect l="l" t="t" r="r" b="b"/>
+            <a:pathLst>
+              <a:path w="120000" h="120000" extrusionOk="0">
+                <a:moveTo>
+                  <a:pt x="0" y="0"/>
+                </a:moveTo>
+                <a:lnTo>
+                  <a:pt x="120000" y="0"/>
+                </a:lnTo>
+                <a:lnTo>
+                  <a:pt x="120000" y="120000"/>
+                </a:lnTo>
+                <a:lnTo>
+                  <a:pt x="0" y="120000"/>
+                </a:lnTo>
+                <a:close/>
+              </a:path>
+            </a:pathLst>
+          </a:custGeom>
+        </p:spPr>
+      </p:sp>
+      <p:sp>
+        <p:nvSpPr>
+          <p:cNvPr id="62" name="Google Shape;62;g3bc3b886ea_0_1:notes"/>
+          <p:cNvSpPr txBox="1">
+            <a:spLocks noGrp="1"/>
+          </p:cNvSpPr>
+          <p:nvPr>
+            <p:ph type="body" idx="1"/>
+          </p:nvPr>
+        </p:nvSpPr>
+        <p:spPr>
+          <a:xfrm>
+            <a:off x="685800" y="4343400"/>
+            <a:ext cx="5486400" cy="4114800"/>
+          </a:xfrm>
+          <a:prstGeom prst="rect">
+            <a:avLst/>
+          </a:prstGeom>
+        </p:spPr>
+        <p:txBody>
+          <a:bodyPr spcFirstLastPara="1" wrap="square" lIns="91425" tIns="91425" rIns="91425" bIns="91425" anchor="t" anchorCtr="0">
+            <a:noAutofit/>
+          </a:bodyPr>
+          <a:lstStyle/>
+          <a:p>
+            <a:pPr marL="0" lvl="0" indent="0" algn="l" rtl="0">
+              <a:spcBef>
+                <a:spcPts val="0"/>
+              </a:spcBef>
+              <a:spcAft>
+                <a:spcPts val="0"/>
+              </a:spcAft>
+              <a:buNone/>
+            </a:pPr>
+            <a:endParaRPr/>
+          </a:p>
+        </p:txBody>
+      </p:sp>
+    </p:spTree>
+  </p:cSld>
+  <p:clrMapOvr>
+    <a:masterClrMapping/>
+  </p:clrMapOvr>
+</p:notes>
+</file>
+
+<file path=ppt/notesSlides/notesSlide14.xml><?xml version="1.0" encoding="utf-8"?>
+<p:notes xmlns:a="http://schemas.openxmlformats.org/drawingml/2006/main" xmlns:r="http://schemas.openxmlformats.org/officeDocument/2006/relationships" xmlns:p="http://schemas.openxmlformats.org/presentationml/2006/main" showMasterSp="0" showMasterPhAnim="0">
+  <p:cSld>
+    <p:spTree>
+      <p:nvGrpSpPr>
+        <p:cNvPr id="1" name="Shape 60"/>
+        <p:cNvGrpSpPr/>
+        <p:nvPr/>
+      </p:nvGrpSpPr>
+      <p:grpSpPr>
+        <a:xfrm>
+          <a:off x="0" y="0"/>
+          <a:ext cx="0" cy="0"/>
+          <a:chOff x="0" y="0"/>
+          <a:chExt cx="0" cy="0"/>
+        </a:xfrm>
+      </p:grpSpPr>
+      <p:sp>
+        <p:nvSpPr>
+          <p:cNvPr id="61" name="Google Shape;61;g3bc3b886ea_0_1:notes"/>
+          <p:cNvSpPr>
+            <a:spLocks noGrp="1" noRot="1" noChangeAspect="1"/>
+          </p:cNvSpPr>
+          <p:nvPr>
+            <p:ph type="sldImg" idx="2"/>
+          </p:nvPr>
+        </p:nvSpPr>
+        <p:spPr>
+          <a:xfrm>
+            <a:off x="381000" y="685800"/>
+            <a:ext cx="6096000" cy="3429000"/>
+          </a:xfrm>
+          <a:custGeom>
+            <a:avLst/>
+            <a:gdLst/>
+            <a:ahLst/>
+            <a:cxnLst/>
+            <a:rect l="l" t="t" r="r" b="b"/>
+            <a:pathLst>
+              <a:path w="120000" h="120000" extrusionOk="0">
+                <a:moveTo>
+                  <a:pt x="0" y="0"/>
+                </a:moveTo>
+                <a:lnTo>
+                  <a:pt x="120000" y="0"/>
+                </a:lnTo>
+                <a:lnTo>
+                  <a:pt x="120000" y="120000"/>
+                </a:lnTo>
+                <a:lnTo>
+                  <a:pt x="0" y="120000"/>
+                </a:lnTo>
+                <a:close/>
+              </a:path>
+            </a:pathLst>
+          </a:custGeom>
+        </p:spPr>
+      </p:sp>
+      <p:sp>
+        <p:nvSpPr>
+          <p:cNvPr id="62" name="Google Shape;62;g3bc3b886ea_0_1:notes"/>
+          <p:cNvSpPr txBox="1">
+            <a:spLocks noGrp="1"/>
+          </p:cNvSpPr>
+          <p:nvPr>
+            <p:ph type="body" idx="1"/>
+          </p:nvPr>
+        </p:nvSpPr>
+        <p:spPr>
+          <a:xfrm>
+            <a:off x="685800" y="4343400"/>
+            <a:ext cx="5486400" cy="4114800"/>
+          </a:xfrm>
+          <a:prstGeom prst="rect">
+            <a:avLst/>
+          </a:prstGeom>
+        </p:spPr>
+        <p:txBody>
+          <a:bodyPr spcFirstLastPara="1" wrap="square" lIns="91425" tIns="91425" rIns="91425" bIns="91425" anchor="t" anchorCtr="0">
+            <a:noAutofit/>
+          </a:bodyPr>
+          <a:lstStyle/>
+          <a:p>
+            <a:pPr marL="0" lvl="0" indent="0" algn="l" rtl="0">
+              <a:spcBef>
+                <a:spcPts val="0"/>
+              </a:spcBef>
+              <a:spcAft>
+                <a:spcPts val="0"/>
+              </a:spcAft>
+              <a:buNone/>
+            </a:pPr>
+            <a:endParaRPr/>
+          </a:p>
+        </p:txBody>
+      </p:sp>
+    </p:spTree>
+  </p:cSld>
+  <p:clrMapOvr>
+    <a:masterClrMapping/>
+  </p:clrMapOvr>
+</p:notes>
+</file>
+
+<file path=ppt/notesSlides/notesSlide15.xml><?xml version="1.0" encoding="utf-8"?>
+<p:notes xmlns:a="http://schemas.openxmlformats.org/drawingml/2006/main" xmlns:r="http://schemas.openxmlformats.org/officeDocument/2006/relationships" xmlns:p="http://schemas.openxmlformats.org/presentationml/2006/main" showMasterSp="0" showMasterPhAnim="0">
+  <p:cSld>
+    <p:spTree>
+      <p:nvGrpSpPr>
+        <p:cNvPr id="1" name="Shape 60"/>
+        <p:cNvGrpSpPr/>
+        <p:nvPr/>
+      </p:nvGrpSpPr>
+      <p:grpSpPr>
+        <a:xfrm>
+          <a:off x="0" y="0"/>
+          <a:ext cx="0" cy="0"/>
+          <a:chOff x="0" y="0"/>
+          <a:chExt cx="0" cy="0"/>
+        </a:xfrm>
+      </p:grpSpPr>
+      <p:sp>
+        <p:nvSpPr>
+          <p:cNvPr id="61" name="Google Shape;61;g3bc3b886ea_0_1:notes"/>
+          <p:cNvSpPr>
+            <a:spLocks noGrp="1" noRot="1" noChangeAspect="1"/>
+          </p:cNvSpPr>
+          <p:nvPr>
+            <p:ph type="sldImg" idx="2"/>
+          </p:nvPr>
+        </p:nvSpPr>
+        <p:spPr>
+          <a:xfrm>
+            <a:off x="381000" y="685800"/>
+            <a:ext cx="6096000" cy="3429000"/>
+          </a:xfrm>
+          <a:custGeom>
+            <a:avLst/>
+            <a:gdLst/>
+            <a:ahLst/>
+            <a:cxnLst/>
+            <a:rect l="l" t="t" r="r" b="b"/>
+            <a:pathLst>
+              <a:path w="120000" h="120000" extrusionOk="0">
+                <a:moveTo>
+                  <a:pt x="0" y="0"/>
+                </a:moveTo>
+                <a:lnTo>
+                  <a:pt x="120000" y="0"/>
+                </a:lnTo>
+                <a:lnTo>
+                  <a:pt x="120000" y="120000"/>
+                </a:lnTo>
+                <a:lnTo>
+                  <a:pt x="0" y="120000"/>
+                </a:lnTo>
+                <a:close/>
+              </a:path>
+            </a:pathLst>
+          </a:custGeom>
+        </p:spPr>
+      </p:sp>
+      <p:sp>
+        <p:nvSpPr>
+          <p:cNvPr id="62" name="Google Shape;62;g3bc3b886ea_0_1:notes"/>
+          <p:cNvSpPr txBox="1">
+            <a:spLocks noGrp="1"/>
+          </p:cNvSpPr>
+          <p:nvPr>
+            <p:ph type="body" idx="1"/>
+          </p:nvPr>
+        </p:nvSpPr>
+        <p:spPr>
+          <a:xfrm>
+            <a:off x="685800" y="4343400"/>
+            <a:ext cx="5486400" cy="4114800"/>
+          </a:xfrm>
+          <a:prstGeom prst="rect">
+            <a:avLst/>
+          </a:prstGeom>
+        </p:spPr>
+        <p:txBody>
+          <a:bodyPr spcFirstLastPara="1" wrap="square" lIns="91425" tIns="91425" rIns="91425" bIns="91425" anchor="t" anchorCtr="0">
+            <a:noAutofit/>
+          </a:bodyPr>
+          <a:lstStyle/>
+          <a:p>
+            <a:pPr marL="0" lvl="0" indent="0" algn="l" rtl="0">
+              <a:spcBef>
+                <a:spcPts val="0"/>
+              </a:spcBef>
+              <a:spcAft>
+                <a:spcPts val="0"/>
+              </a:spcAft>
+              <a:buNone/>
+            </a:pPr>
+            <a:endParaRPr/>
+          </a:p>
+        </p:txBody>
+      </p:sp>
+    </p:spTree>
+  </p:cSld>
+  <p:clrMapOvr>
+    <a:masterClrMapping/>
+  </p:clrMapOvr>
+</p:notes>
+</file>
+
+<file path=ppt/notesSlides/notesSlide16.xml><?xml version="1.0" encoding="utf-8"?>
+<p:notes xmlns:a="http://schemas.openxmlformats.org/drawingml/2006/main" xmlns:r="http://schemas.openxmlformats.org/officeDocument/2006/relationships" xmlns:p="http://schemas.openxmlformats.org/presentationml/2006/main" showMasterSp="0" showMasterPhAnim="0">
+  <p:cSld>
+    <p:spTree>
+      <p:nvGrpSpPr>
         <p:cNvPr id="1" name="Shape 80"/>
         <p:cNvGrpSpPr/>
         <p:nvPr/>
@@ -2381,7 +2696,7 @@
             <a:fld id="{7D0065BE-0657-4A47-90AD-C21C55E16B19}" type="datetime4">
               <a:rPr lang="en-US" smtClean="0"/>
               <a:pPr/>
-              <a:t>March 19, 2020</a:t>
+              <a:t>March 20, 2020</a:t>
             </a:fld>
             <a:endParaRPr lang="en-US"/>
           </a:p>
@@ -2577,7 +2892,7 @@
             <a:fld id="{A16C3AA4-67BE-44F7-809A-3582401494AF}" type="datetime4">
               <a:rPr lang="en-US" smtClean="0"/>
               <a:pPr/>
-              <a:t>March 19, 2020</a:t>
+              <a:t>March 20, 2020</a:t>
             </a:fld>
             <a:endParaRPr lang="en-US"/>
           </a:p>
@@ -2773,7 +3088,7 @@
             <a:fld id="{25172EEB-1769-4776-AD69-E7C1260563EB}" type="datetime4">
               <a:rPr lang="en-US" smtClean="0"/>
               <a:pPr/>
-              <a:t>March 19, 2020</a:t>
+              <a:t>March 20, 2020</a:t>
             </a:fld>
             <a:endParaRPr lang="en-US"/>
           </a:p>
@@ -3331,7 +3646,7 @@
             <a:fld id="{D47BB8AF-C16A-4836-A92D-61834B5F0BA5}" type="datetime4">
               <a:rPr lang="en-US" smtClean="0"/>
               <a:pPr/>
-              <a:t>March 19, 2020</a:t>
+              <a:t>March 20, 2020</a:t>
             </a:fld>
             <a:endParaRPr lang="en-US"/>
           </a:p>
@@ -3723,7 +4038,7 @@
             <a:fld id="{647D2193-4505-4A75-99BB-880C6989A757}" type="datetime4">
               <a:rPr lang="en-US" smtClean="0"/>
               <a:pPr/>
-              <a:t>March 19, 2020</a:t>
+              <a:t>March 20, 2020</a:t>
             </a:fld>
             <a:endParaRPr lang="en-US"/>
           </a:p>
@@ -4003,7 +4318,7 @@
             <a:fld id="{113A18F4-33C3-445B-924C-31108C51719C}" type="datetime4">
               <a:rPr lang="en-US" smtClean="0"/>
               <a:pPr/>
-              <a:t>March 19, 2020</a:t>
+              <a:t>March 20, 2020</a:t>
             </a:fld>
             <a:endParaRPr lang="en-US"/>
           </a:p>
@@ -4399,7 +4714,7 @@
             <a:fld id="{3AF7543A-E259-478F-9E0D-57BA40E442B7}" type="datetime4">
               <a:rPr lang="en-US" smtClean="0"/>
               <a:pPr/>
-              <a:t>March 19, 2020</a:t>
+              <a:t>March 20, 2020</a:t>
             </a:fld>
             <a:endParaRPr lang="en-US"/>
           </a:p>
@@ -4531,7 +4846,7 @@
             <a:fld id="{1EFB012D-77A1-44B0-BB26-329BA1EE55C9}" type="datetime4">
               <a:rPr lang="en-US" smtClean="0"/>
               <a:pPr/>
-              <a:t>March 19, 2020</a:t>
+              <a:t>March 20, 2020</a:t>
             </a:fld>
             <a:endParaRPr lang="en-US"/>
           </a:p>
@@ -4722,7 +5037,7 @@
             <a:fld id="{94B7499E-3031-413E-B01E-B94970708CAA}" type="datetime4">
               <a:rPr lang="en-US" smtClean="0"/>
               <a:pPr/>
-              <a:t>March 19, 2020</a:t>
+              <a:t>March 20, 2020</a:t>
             </a:fld>
             <a:endParaRPr lang="en-US"/>
           </a:p>
@@ -5067,7 +5382,7 @@
             <a:fld id="{DC7EAB0C-2220-4D0E-A0DD-DB7FA0F742F4}" type="datetime4">
               <a:rPr lang="en-US" smtClean="0"/>
               <a:pPr/>
-              <a:t>March 19, 2020</a:t>
+              <a:t>March 20, 2020</a:t>
             </a:fld>
             <a:endParaRPr lang="en-US"/>
           </a:p>
@@ -5447,7 +5762,7 @@
             <a:fld id="{E3416D63-31BF-4B94-B6C5-E20B2C63F515}" type="datetime4">
               <a:rPr lang="en-US" smtClean="0"/>
               <a:pPr/>
-              <a:t>March 19, 2020</a:t>
+              <a:t>March 20, 2020</a:t>
             </a:fld>
             <a:endParaRPr lang="en-US"/>
           </a:p>
@@ -5876,7 +6191,7 @@
             <a:fld id="{62B1B13E-D5AF-485E-81A1-82A140076526}" type="datetime4">
               <a:rPr lang="en-US" smtClean="0"/>
               <a:pPr/>
-              <a:t>March 19, 2020</a:t>
+              <a:t>March 20, 2020</a:t>
             </a:fld>
             <a:endParaRPr lang="en-US" dirty="0"/>
           </a:p>
@@ -7201,28 +7516,7 @@
                 <a:latin typeface="Times New Roman" panose="02020603050405020304" pitchFamily="18" charset="0"/>
                 <a:cs typeface="Times New Roman" panose="02020603050405020304" pitchFamily="18" charset="0"/>
               </a:rPr>
-              <a:t>551 personnes </a:t>
-            </a:r>
-            <a:r>
-              <a:rPr lang="fr-FR" sz="1600" dirty="0" smtClean="0">
-                <a:latin typeface="Times New Roman" panose="02020603050405020304" pitchFamily="18" charset="0"/>
-                <a:cs typeface="Times New Roman" panose="02020603050405020304" pitchFamily="18" charset="0"/>
-              </a:rPr>
-              <a:t>qui ont participé à l’</a:t>
-            </a:r>
-            <a:r>
-              <a:rPr lang="fr-FR" sz="1600" dirty="0" smtClean="0">
-                <a:latin typeface="Times New Roman" panose="02020603050405020304" pitchFamily="18" charset="0"/>
-                <a:cs typeface="Times New Roman" panose="02020603050405020304" pitchFamily="18" charset="0"/>
-              </a:rPr>
-              <a:t>é</a:t>
-            </a:r>
-            <a:r>
-              <a:rPr lang="fr-FR" sz="1600" dirty="0" smtClean="0">
-                <a:latin typeface="Times New Roman" panose="02020603050405020304" pitchFamily="18" charset="0"/>
-                <a:cs typeface="Times New Roman" panose="02020603050405020304" pitchFamily="18" charset="0"/>
-              </a:rPr>
-              <a:t>vènement ont &lt;&lt;match&gt;&gt; avec un ou une partenaire en vue d’un second rendez-vous.</a:t>
+              <a:t>551 personnes qui ont participé à l’évènement ont &lt;&lt;match&gt;&gt; avec un ou une partenaire en vue d’un second rendez-vous.</a:t>
             </a:r>
           </a:p>
           <a:p>
@@ -7558,6 +7852,596 @@
 <file path=ppt/slides/slide13.xml><?xml version="1.0" encoding="utf-8"?>
 <p:sld xmlns:a="http://schemas.openxmlformats.org/drawingml/2006/main" xmlns:r="http://schemas.openxmlformats.org/officeDocument/2006/relationships" xmlns:p="http://schemas.openxmlformats.org/presentationml/2006/main">
   <p:cSld>
+    <p:spTree>
+      <p:nvGrpSpPr>
+        <p:cNvPr id="1" name="Shape 63"/>
+        <p:cNvGrpSpPr/>
+        <p:nvPr/>
+      </p:nvGrpSpPr>
+      <p:grpSpPr>
+        <a:xfrm>
+          <a:off x="0" y="0"/>
+          <a:ext cx="0" cy="0"/>
+          <a:chOff x="0" y="0"/>
+          <a:chExt cx="0" cy="0"/>
+        </a:xfrm>
+      </p:grpSpPr>
+      <p:sp>
+        <p:nvSpPr>
+          <p:cNvPr id="64" name="Google Shape;64;p14"/>
+          <p:cNvSpPr/>
+          <p:nvPr/>
+        </p:nvSpPr>
+        <p:spPr>
+          <a:xfrm>
+            <a:off x="0" y="4764425"/>
+            <a:ext cx="9144300" cy="373200"/>
+          </a:xfrm>
+          <a:prstGeom prst="rect">
+            <a:avLst/>
+          </a:prstGeom>
+          <a:solidFill>
+            <a:srgbClr val="1F4352"/>
+          </a:solidFill>
+          <a:ln>
+            <a:noFill/>
+          </a:ln>
+        </p:spPr>
+        <p:txBody>
+          <a:bodyPr spcFirstLastPara="1" wrap="square" lIns="91425" tIns="91425" rIns="91425" bIns="91425" anchor="ctr" anchorCtr="0">
+            <a:noAutofit/>
+          </a:bodyPr>
+          <a:lstStyle/>
+          <a:p>
+            <a:pPr marL="0" lvl="0" indent="0" algn="l" rtl="0">
+              <a:spcBef>
+                <a:spcPts val="0"/>
+              </a:spcBef>
+              <a:spcAft>
+                <a:spcPts val="0"/>
+              </a:spcAft>
+              <a:buNone/>
+            </a:pPr>
+            <a:endParaRPr/>
+          </a:p>
+        </p:txBody>
+      </p:sp>
+      <p:pic>
+        <p:nvPicPr>
+          <p:cNvPr id="65" name="Google Shape;65;p14"/>
+          <p:cNvPicPr preferRelativeResize="0"/>
+          <p:nvPr/>
+        </p:nvPicPr>
+        <p:blipFill>
+          <a:blip r:embed="rId3">
+            <a:alphaModFix/>
+          </a:blip>
+          <a:stretch>
+            <a:fillRect/>
+          </a:stretch>
+        </p:blipFill>
+        <p:spPr>
+          <a:xfrm>
+            <a:off x="443527" y="4846129"/>
+            <a:ext cx="576901" cy="209780"/>
+          </a:xfrm>
+          <a:prstGeom prst="rect">
+            <a:avLst/>
+          </a:prstGeom>
+          <a:noFill/>
+          <a:ln>
+            <a:noFill/>
+          </a:ln>
+        </p:spPr>
+      </p:pic>
+      <p:pic>
+        <p:nvPicPr>
+          <p:cNvPr id="10242" name="Picture 2"/>
+          <p:cNvPicPr>
+            <a:picLocks noChangeAspect="1" noChangeArrowheads="1"/>
+          </p:cNvPicPr>
+          <p:nvPr/>
+        </p:nvPicPr>
+        <p:blipFill>
+          <a:blip r:embed="rId4">
+            <a:extLst>
+              <a:ext uri="{28A0092B-C50C-407E-A947-70E740481C1C}">
+                <a14:useLocalDpi xmlns:a14="http://schemas.microsoft.com/office/drawing/2010/main" val="0"/>
+              </a:ext>
+            </a:extLst>
+          </a:blip>
+          <a:stretch>
+            <a:fillRect/>
+          </a:stretch>
+        </p:blipFill>
+        <p:spPr bwMode="auto">
+          <a:xfrm>
+            <a:off x="1520316" y="1281630"/>
+            <a:ext cx="6333514" cy="2963873"/>
+          </a:xfrm>
+          <a:prstGeom prst="roundRect">
+            <a:avLst>
+              <a:gd name="adj" fmla="val 8594"/>
+            </a:avLst>
+          </a:prstGeom>
+          <a:solidFill>
+            <a:srgbClr val="FFFFFF">
+              <a:shade val="85000"/>
+            </a:srgbClr>
+          </a:solidFill>
+          <a:ln>
+            <a:noFill/>
+          </a:ln>
+          <a:effectLst>
+            <a:reflection blurRad="12700" stA="38000" endPos="28000" dist="5000" dir="5400000" sy="-100000" algn="bl" rotWithShape="0"/>
+          </a:effectLst>
+          <a:extLst/>
+        </p:spPr>
+      </p:pic>
+      <p:sp>
+        <p:nvSpPr>
+          <p:cNvPr id="2" name="Rectangle 1"/>
+          <p:cNvSpPr/>
+          <p:nvPr/>
+        </p:nvSpPr>
+        <p:spPr>
+          <a:xfrm>
+            <a:off x="1020427" y="555526"/>
+            <a:ext cx="7166098" cy="738664"/>
+          </a:xfrm>
+          <a:prstGeom prst="rect">
+            <a:avLst/>
+          </a:prstGeom>
+        </p:spPr>
+        <p:txBody>
+          <a:bodyPr wrap="square">
+            <a:spAutoFit/>
+          </a:bodyPr>
+          <a:lstStyle/>
+          <a:p>
+            <a:r>
+              <a:rPr lang="fr-FR" dirty="0" smtClean="0">
+                <a:latin typeface="Times New Roman" panose="02020603050405020304" pitchFamily="18" charset="0"/>
+                <a:cs typeface="Times New Roman" panose="02020603050405020304" pitchFamily="18" charset="0"/>
+              </a:rPr>
+              <a:t>Au cours cet évènement  tous les participant n’avaient pas les mêmes objectif</a:t>
+            </a:r>
+            <a:r>
+              <a:rPr lang="fr-FR" dirty="0" smtClean="0">
+                <a:latin typeface="Times New Roman" panose="02020603050405020304" pitchFamily="18" charset="0"/>
+                <a:cs typeface="Times New Roman" panose="02020603050405020304" pitchFamily="18" charset="0"/>
+              </a:rPr>
+              <a:t>, en effet bien que certains ou certaines sont à la recherche du grand amour,  un bon nombre n’étaient présent juste pour le fun ou le plaisir de connaitre d’autres personnes. </a:t>
+            </a:r>
+            <a:endParaRPr lang="fr-FR" dirty="0"/>
+          </a:p>
+        </p:txBody>
+      </p:sp>
+    </p:spTree>
+    <p:extLst>
+      <p:ext uri="{BB962C8B-B14F-4D97-AF65-F5344CB8AC3E}">
+        <p14:creationId xmlns:p14="http://schemas.microsoft.com/office/powerpoint/2010/main" val="2727476678"/>
+      </p:ext>
+    </p:extLst>
+  </p:cSld>
+  <p:clrMapOvr>
+    <a:masterClrMapping/>
+  </p:clrMapOvr>
+  <p:timing>
+    <p:tnLst>
+      <p:par>
+        <p:cTn id="1" dur="indefinite" restart="never" nodeType="tmRoot"/>
+      </p:par>
+    </p:tnLst>
+  </p:timing>
+</p:sld>
+</file>
+
+<file path=ppt/slides/slide14.xml><?xml version="1.0" encoding="utf-8"?>
+<p:sld xmlns:a="http://schemas.openxmlformats.org/drawingml/2006/main" xmlns:r="http://schemas.openxmlformats.org/officeDocument/2006/relationships" xmlns:p="http://schemas.openxmlformats.org/presentationml/2006/main">
+  <p:cSld>
+    <p:spTree>
+      <p:nvGrpSpPr>
+        <p:cNvPr id="1" name="Shape 63"/>
+        <p:cNvGrpSpPr/>
+        <p:nvPr/>
+      </p:nvGrpSpPr>
+      <p:grpSpPr>
+        <a:xfrm>
+          <a:off x="0" y="0"/>
+          <a:ext cx="0" cy="0"/>
+          <a:chOff x="0" y="0"/>
+          <a:chExt cx="0" cy="0"/>
+        </a:xfrm>
+      </p:grpSpPr>
+      <p:sp>
+        <p:nvSpPr>
+          <p:cNvPr id="64" name="Google Shape;64;p14"/>
+          <p:cNvSpPr/>
+          <p:nvPr/>
+        </p:nvSpPr>
+        <p:spPr>
+          <a:xfrm>
+            <a:off x="0" y="4764425"/>
+            <a:ext cx="9144300" cy="373200"/>
+          </a:xfrm>
+          <a:prstGeom prst="rect">
+            <a:avLst/>
+          </a:prstGeom>
+          <a:solidFill>
+            <a:srgbClr val="1F4352"/>
+          </a:solidFill>
+          <a:ln>
+            <a:noFill/>
+          </a:ln>
+        </p:spPr>
+        <p:txBody>
+          <a:bodyPr spcFirstLastPara="1" wrap="square" lIns="91425" tIns="91425" rIns="91425" bIns="91425" anchor="ctr" anchorCtr="0">
+            <a:noAutofit/>
+          </a:bodyPr>
+          <a:lstStyle/>
+          <a:p>
+            <a:pPr marL="0" lvl="0" indent="0" algn="l" rtl="0">
+              <a:spcBef>
+                <a:spcPts val="0"/>
+              </a:spcBef>
+              <a:spcAft>
+                <a:spcPts val="0"/>
+              </a:spcAft>
+              <a:buNone/>
+            </a:pPr>
+            <a:endParaRPr/>
+          </a:p>
+        </p:txBody>
+      </p:sp>
+      <p:pic>
+        <p:nvPicPr>
+          <p:cNvPr id="65" name="Google Shape;65;p14"/>
+          <p:cNvPicPr preferRelativeResize="0"/>
+          <p:nvPr/>
+        </p:nvPicPr>
+        <p:blipFill>
+          <a:blip r:embed="rId3">
+            <a:alphaModFix/>
+          </a:blip>
+          <a:stretch>
+            <a:fillRect/>
+          </a:stretch>
+        </p:blipFill>
+        <p:spPr>
+          <a:xfrm>
+            <a:off x="443527" y="4846129"/>
+            <a:ext cx="576901" cy="209780"/>
+          </a:xfrm>
+          <a:prstGeom prst="rect">
+            <a:avLst/>
+          </a:prstGeom>
+          <a:noFill/>
+          <a:ln>
+            <a:noFill/>
+          </a:ln>
+        </p:spPr>
+      </p:pic>
+      <p:pic>
+        <p:nvPicPr>
+          <p:cNvPr id="10242" name="Picture 2"/>
+          <p:cNvPicPr>
+            <a:picLocks noChangeAspect="1" noChangeArrowheads="1"/>
+          </p:cNvPicPr>
+          <p:nvPr/>
+        </p:nvPicPr>
+        <p:blipFill>
+          <a:blip r:embed="rId4">
+            <a:extLst>
+              <a:ext uri="{28A0092B-C50C-407E-A947-70E740481C1C}">
+                <a14:useLocalDpi xmlns:a14="http://schemas.microsoft.com/office/drawing/2010/main" val="0"/>
+              </a:ext>
+            </a:extLst>
+          </a:blip>
+          <a:stretch>
+            <a:fillRect/>
+          </a:stretch>
+        </p:blipFill>
+        <p:spPr bwMode="auto">
+          <a:xfrm>
+            <a:off x="1509801" y="1668223"/>
+            <a:ext cx="6014527" cy="2805283"/>
+          </a:xfrm>
+          <a:prstGeom prst="roundRect">
+            <a:avLst>
+              <a:gd name="adj" fmla="val 8594"/>
+            </a:avLst>
+          </a:prstGeom>
+          <a:solidFill>
+            <a:srgbClr val="FFFFFF">
+              <a:shade val="85000"/>
+            </a:srgbClr>
+          </a:solidFill>
+          <a:ln>
+            <a:noFill/>
+          </a:ln>
+          <a:effectLst>
+            <a:reflection blurRad="12700" stA="38000" endPos="28000" dist="5000" dir="5400000" sy="-100000" algn="bl" rotWithShape="0"/>
+          </a:effectLst>
+          <a:extLst/>
+        </p:spPr>
+      </p:pic>
+      <p:sp>
+        <p:nvSpPr>
+          <p:cNvPr id="2" name="Rectangle 1"/>
+          <p:cNvSpPr/>
+          <p:nvPr/>
+        </p:nvSpPr>
+        <p:spPr>
+          <a:xfrm>
+            <a:off x="827584" y="411510"/>
+            <a:ext cx="7166098" cy="1384995"/>
+          </a:xfrm>
+          <a:prstGeom prst="rect">
+            <a:avLst/>
+          </a:prstGeom>
+        </p:spPr>
+        <p:txBody>
+          <a:bodyPr wrap="square">
+            <a:spAutoFit/>
+          </a:bodyPr>
+          <a:lstStyle/>
+          <a:p>
+            <a:r>
+              <a:rPr lang="fr-FR" dirty="0" smtClean="0">
+                <a:latin typeface="Times New Roman" panose="02020603050405020304" pitchFamily="18" charset="0"/>
+                <a:cs typeface="Times New Roman" panose="02020603050405020304" pitchFamily="18" charset="0"/>
+              </a:rPr>
+              <a:t>Classement des participant par fréquence à laquelle ils ont des rendez-vous.</a:t>
+            </a:r>
+          </a:p>
+          <a:p>
+            <a:r>
+              <a:rPr lang="fr-FR" dirty="0" smtClean="0">
+                <a:latin typeface="Times New Roman" panose="02020603050405020304" pitchFamily="18" charset="0"/>
+                <a:cs typeface="Times New Roman" panose="02020603050405020304" pitchFamily="18" charset="0"/>
+              </a:rPr>
+              <a:t>Au travers de ce graphique on s’aperçois les personnes qui ne date jamais voir très rarement ont un pourcentage de cœur brisé très élevé.</a:t>
+            </a:r>
+          </a:p>
+          <a:p>
+            <a:r>
+              <a:rPr lang="fr-FR" dirty="0" smtClean="0">
+                <a:latin typeface="Times New Roman" panose="02020603050405020304" pitchFamily="18" charset="0"/>
+                <a:cs typeface="Times New Roman" panose="02020603050405020304" pitchFamily="18" charset="0"/>
+              </a:rPr>
+              <a:t>Tandis que les personnes qui ont régulièrement des rendez-vous ont 58% de &lt;&lt;Match&gt;&gt;, donc on peut-on en déduire que  le fait de sortir régulièrement fais qu’on à plus de chance de trouver l’amour ? </a:t>
+            </a:r>
+            <a:endParaRPr lang="fr-FR" dirty="0">
+              <a:latin typeface="Times New Roman" panose="02020603050405020304" pitchFamily="18" charset="0"/>
+              <a:cs typeface="Times New Roman" panose="02020603050405020304" pitchFamily="18" charset="0"/>
+            </a:endParaRPr>
+          </a:p>
+        </p:txBody>
+      </p:sp>
+    </p:spTree>
+    <p:extLst>
+      <p:ext uri="{BB962C8B-B14F-4D97-AF65-F5344CB8AC3E}">
+        <p14:creationId xmlns:p14="http://schemas.microsoft.com/office/powerpoint/2010/main" val="1924846569"/>
+      </p:ext>
+    </p:extLst>
+  </p:cSld>
+  <p:clrMapOvr>
+    <a:masterClrMapping/>
+  </p:clrMapOvr>
+  <p:timing>
+    <p:tnLst>
+      <p:par>
+        <p:cTn id="1" dur="indefinite" restart="never" nodeType="tmRoot"/>
+      </p:par>
+    </p:tnLst>
+  </p:timing>
+</p:sld>
+</file>
+
+<file path=ppt/slides/slide15.xml><?xml version="1.0" encoding="utf-8"?>
+<p:sld xmlns:a="http://schemas.openxmlformats.org/drawingml/2006/main" xmlns:r="http://schemas.openxmlformats.org/officeDocument/2006/relationships" xmlns:p="http://schemas.openxmlformats.org/presentationml/2006/main">
+  <p:cSld>
+    <p:spTree>
+      <p:nvGrpSpPr>
+        <p:cNvPr id="1" name="Shape 63"/>
+        <p:cNvGrpSpPr/>
+        <p:nvPr/>
+      </p:nvGrpSpPr>
+      <p:grpSpPr>
+        <a:xfrm>
+          <a:off x="0" y="0"/>
+          <a:ext cx="0" cy="0"/>
+          <a:chOff x="0" y="0"/>
+          <a:chExt cx="0" cy="0"/>
+        </a:xfrm>
+      </p:grpSpPr>
+      <p:sp>
+        <p:nvSpPr>
+          <p:cNvPr id="64" name="Google Shape;64;p14"/>
+          <p:cNvSpPr/>
+          <p:nvPr/>
+        </p:nvSpPr>
+        <p:spPr>
+          <a:xfrm>
+            <a:off x="0" y="4764425"/>
+            <a:ext cx="9144300" cy="373200"/>
+          </a:xfrm>
+          <a:prstGeom prst="rect">
+            <a:avLst/>
+          </a:prstGeom>
+          <a:solidFill>
+            <a:srgbClr val="1F4352"/>
+          </a:solidFill>
+          <a:ln>
+            <a:noFill/>
+          </a:ln>
+        </p:spPr>
+        <p:txBody>
+          <a:bodyPr spcFirstLastPara="1" wrap="square" lIns="91425" tIns="91425" rIns="91425" bIns="91425" anchor="ctr" anchorCtr="0">
+            <a:noAutofit/>
+          </a:bodyPr>
+          <a:lstStyle/>
+          <a:p>
+            <a:pPr marL="0" lvl="0" indent="0" algn="l" rtl="0">
+              <a:spcBef>
+                <a:spcPts val="0"/>
+              </a:spcBef>
+              <a:spcAft>
+                <a:spcPts val="0"/>
+              </a:spcAft>
+              <a:buNone/>
+            </a:pPr>
+            <a:endParaRPr/>
+          </a:p>
+        </p:txBody>
+      </p:sp>
+      <p:pic>
+        <p:nvPicPr>
+          <p:cNvPr id="65" name="Google Shape;65;p14"/>
+          <p:cNvPicPr preferRelativeResize="0"/>
+          <p:nvPr/>
+        </p:nvPicPr>
+        <p:blipFill>
+          <a:blip r:embed="rId3">
+            <a:alphaModFix/>
+          </a:blip>
+          <a:stretch>
+            <a:fillRect/>
+          </a:stretch>
+        </p:blipFill>
+        <p:spPr>
+          <a:xfrm>
+            <a:off x="443527" y="4846129"/>
+            <a:ext cx="576901" cy="209780"/>
+          </a:xfrm>
+          <a:prstGeom prst="rect">
+            <a:avLst/>
+          </a:prstGeom>
+          <a:noFill/>
+          <a:ln>
+            <a:noFill/>
+          </a:ln>
+        </p:spPr>
+      </p:pic>
+      <p:sp>
+        <p:nvSpPr>
+          <p:cNvPr id="2" name="Rectangle 1"/>
+          <p:cNvSpPr/>
+          <p:nvPr/>
+        </p:nvSpPr>
+        <p:spPr>
+          <a:xfrm>
+            <a:off x="850360" y="470972"/>
+            <a:ext cx="7166098" cy="1384995"/>
+          </a:xfrm>
+          <a:prstGeom prst="rect">
+            <a:avLst/>
+          </a:prstGeom>
+        </p:spPr>
+        <p:txBody>
+          <a:bodyPr wrap="square">
+            <a:spAutoFit/>
+          </a:bodyPr>
+          <a:lstStyle/>
+          <a:p>
+            <a:r>
+              <a:rPr lang="fr-FR" dirty="0" smtClean="0">
+                <a:latin typeface="Times New Roman" panose="02020603050405020304" pitchFamily="18" charset="0"/>
+                <a:cs typeface="Times New Roman" panose="02020603050405020304" pitchFamily="18" charset="0"/>
+              </a:rPr>
+              <a:t>Selon le milieux sociaux professionnel les exigences ne sont pas les mêmes</a:t>
+            </a:r>
+            <a:r>
+              <a:rPr lang="fr-FR" dirty="0" smtClean="0">
+                <a:latin typeface="Times New Roman" panose="02020603050405020304" pitchFamily="18" charset="0"/>
+                <a:cs typeface="Times New Roman" panose="02020603050405020304" pitchFamily="18" charset="0"/>
+              </a:rPr>
+              <a:t>, par conséquent la chance de trouvé la bonne personne varie d’une profession à l’autre.</a:t>
+            </a:r>
+          </a:p>
+          <a:p>
+            <a:r>
+              <a:rPr lang="fr-FR" dirty="0" smtClean="0">
+                <a:latin typeface="Times New Roman" panose="02020603050405020304" pitchFamily="18" charset="0"/>
+                <a:cs typeface="Times New Roman" panose="02020603050405020304" pitchFamily="18" charset="0"/>
+              </a:rPr>
+              <a:t>On observe que chez les avocats, les médecins, et les psychologues le pourcentage de cœur brisé et de &lt;&lt;match&gt;&gt; est relativement équilibré au contrario des étudiants, de la finance et marketing ou il y’a plus de cœur brisé que de &lt;&lt;match&gt;&gt;.</a:t>
+            </a:r>
+          </a:p>
+          <a:p>
+            <a:endParaRPr lang="fr-FR" dirty="0" smtClean="0">
+              <a:latin typeface="Times New Roman" panose="02020603050405020304" pitchFamily="18" charset="0"/>
+              <a:cs typeface="Times New Roman" panose="02020603050405020304" pitchFamily="18" charset="0"/>
+            </a:endParaRPr>
+          </a:p>
+        </p:txBody>
+      </p:sp>
+      <p:pic>
+        <p:nvPicPr>
+          <p:cNvPr id="3" name="Image 2"/>
+          <p:cNvPicPr>
+            <a:picLocks noChangeAspect="1"/>
+          </p:cNvPicPr>
+          <p:nvPr/>
+        </p:nvPicPr>
+        <p:blipFill rotWithShape="1">
+          <a:blip r:embed="rId4">
+            <a:extLst>
+              <a:ext uri="{28A0092B-C50C-407E-A947-70E740481C1C}">
+                <a14:useLocalDpi xmlns:a14="http://schemas.microsoft.com/office/drawing/2010/main" val="0"/>
+              </a:ext>
+            </a:extLst>
+          </a:blip>
+          <a:srcRect r="35445"/>
+          <a:stretch/>
+        </p:blipFill>
+        <p:spPr>
+          <a:xfrm>
+            <a:off x="755576" y="1605280"/>
+            <a:ext cx="7888858" cy="2782659"/>
+          </a:xfrm>
+          <a:prstGeom prst="roundRect">
+            <a:avLst>
+              <a:gd name="adj" fmla="val 8594"/>
+            </a:avLst>
+          </a:prstGeom>
+          <a:solidFill>
+            <a:srgbClr val="FFFFFF">
+              <a:shade val="85000"/>
+            </a:srgbClr>
+          </a:solidFill>
+          <a:ln>
+            <a:noFill/>
+          </a:ln>
+          <a:effectLst>
+            <a:reflection blurRad="12700" stA="38000" endPos="28000" dist="5000" dir="5400000" sy="-100000" algn="bl" rotWithShape="0"/>
+          </a:effectLst>
+        </p:spPr>
+      </p:pic>
+    </p:spTree>
+    <p:extLst>
+      <p:ext uri="{BB962C8B-B14F-4D97-AF65-F5344CB8AC3E}">
+        <p14:creationId xmlns:p14="http://schemas.microsoft.com/office/powerpoint/2010/main" val="422855359"/>
+      </p:ext>
+    </p:extLst>
+  </p:cSld>
+  <p:clrMapOvr>
+    <a:masterClrMapping/>
+  </p:clrMapOvr>
+  <p:timing>
+    <p:tnLst>
+      <p:par>
+        <p:cTn id="1" dur="indefinite" restart="never" nodeType="tmRoot"/>
+      </p:par>
+    </p:tnLst>
+  </p:timing>
+</p:sld>
+</file>
+
+<file path=ppt/slides/slide16.xml><?xml version="1.0" encoding="utf-8"?>
+<p:sld xmlns:a="http://schemas.openxmlformats.org/drawingml/2006/main" xmlns:r="http://schemas.openxmlformats.org/officeDocument/2006/relationships" xmlns:p="http://schemas.openxmlformats.org/presentationml/2006/main">
+  <p:cSld>
     <p:bg>
       <p:bgPr>
         <a:solidFill>
@@ -8254,14 +9138,7 @@
                 <a:latin typeface="Times New Roman" panose="02020603050405020304" pitchFamily="18" charset="0"/>
                 <a:cs typeface="Times New Roman" panose="02020603050405020304" pitchFamily="18" charset="0"/>
               </a:rPr>
-              <a:t>          </a:t>
-            </a:r>
-            <a:r>
-              <a:rPr lang="fr-FR" sz="1200" b="1" dirty="0" smtClean="0">
-                <a:latin typeface="Times New Roman" panose="02020603050405020304" pitchFamily="18" charset="0"/>
-                <a:cs typeface="Times New Roman" panose="02020603050405020304" pitchFamily="18" charset="0"/>
-              </a:rPr>
-              <a:t>L’amour*</a:t>
+              <a:t>          L’amour*</a:t>
             </a:r>
             <a:endParaRPr lang="fr-FR" sz="1200" dirty="0" smtClean="0">
               <a:latin typeface="Times New Roman" panose="02020603050405020304" pitchFamily="18" charset="0"/>
@@ -9007,13 +9884,7 @@
               <a:rPr lang="fr-FR" dirty="0" smtClean="0">
                 <a:latin typeface="Times New Roman" panose="02020603050405020304" pitchFamily="18" charset="0"/>
               </a:rPr>
-              <a:t>Lors de cette évènement on dénombre un nombre total de 551 participants dont </a:t>
-            </a:r>
-            <a:r>
-              <a:rPr lang="fr-FR" dirty="0" smtClean="0">
-                <a:latin typeface="Times New Roman" panose="02020603050405020304" pitchFamily="18" charset="0"/>
-              </a:rPr>
-              <a:t>la moyenne d'âge est de 26 ans .</a:t>
+              <a:t>Lors de cette évènement on dénombre un nombre total de 551 participants dont la moyenne d'âge est de 26 ans .</a:t>
             </a:r>
             <a:endParaRPr lang="fr-FR" dirty="0"/>
           </a:p>

</xml_diff>

<commit_message>
update of powerpoint with conclusion
</commit_message>
<xml_diff>
--- a/Rendu/Speed-dating.pptx
+++ b/Rendu/Speed-dating.pptx
@@ -5,7 +5,7 @@
     <p:sldMasterId id="2147483725" r:id="rId1"/>
   </p:sldMasterIdLst>
   <p:notesMasterIdLst>
-    <p:notesMasterId r:id="rId18"/>
+    <p:notesMasterId r:id="rId19"/>
   </p:notesMasterIdLst>
   <p:sldIdLst>
     <p:sldId id="256" r:id="rId2"/>
@@ -23,28 +23,29 @@
     <p:sldId id="280" r:id="rId14"/>
     <p:sldId id="281" r:id="rId15"/>
     <p:sldId id="282" r:id="rId16"/>
-    <p:sldId id="259" r:id="rId17"/>
+    <p:sldId id="283" r:id="rId17"/>
+    <p:sldId id="259" r:id="rId18"/>
   </p:sldIdLst>
   <p:sldSz cx="9144000" cy="5143500" type="screen16x9"/>
   <p:notesSz cx="6858000" cy="9144000"/>
   <p:embeddedFontLst>
     <p:embeddedFont>
       <p:font typeface="Verdana" panose="020B0604030504040204" pitchFamily="34" charset="0"/>
-      <p:regular r:id="rId19"/>
-      <p:bold r:id="rId20"/>
-      <p:italic r:id="rId21"/>
-      <p:boldItalic r:id="rId22"/>
+      <p:regular r:id="rId20"/>
+      <p:bold r:id="rId21"/>
+      <p:italic r:id="rId22"/>
+      <p:boldItalic r:id="rId23"/>
     </p:embeddedFont>
     <p:embeddedFont>
       <p:font typeface="Wingdings 2" panose="05020102010507070707" pitchFamily="18" charset="2"/>
-      <p:regular r:id="rId23"/>
+      <p:regular r:id="rId24"/>
     </p:embeddedFont>
     <p:embeddedFont>
       <p:font typeface="Montserrat" panose="020B0604020202020204" charset="0"/>
-      <p:regular r:id="rId24"/>
-      <p:bold r:id="rId25"/>
-      <p:italic r:id="rId26"/>
-      <p:boldItalic r:id="rId27"/>
+      <p:regular r:id="rId25"/>
+      <p:bold r:id="rId26"/>
+      <p:italic r:id="rId27"/>
+      <p:boldItalic r:id="rId28"/>
     </p:embeddedFont>
   </p:embeddedFontLst>
   <p:defaultTextStyle>
@@ -1454,6 +1455,110 @@
 </file>
 
 <file path=ppt/notesSlides/notesSlide16.xml><?xml version="1.0" encoding="utf-8"?>
+<p:notes xmlns:a="http://schemas.openxmlformats.org/drawingml/2006/main" xmlns:r="http://schemas.openxmlformats.org/officeDocument/2006/relationships" xmlns:p="http://schemas.openxmlformats.org/presentationml/2006/main" showMasterSp="0" showMasterPhAnim="0">
+  <p:cSld>
+    <p:spTree>
+      <p:nvGrpSpPr>
+        <p:cNvPr id="1" name="Shape 60"/>
+        <p:cNvGrpSpPr/>
+        <p:nvPr/>
+      </p:nvGrpSpPr>
+      <p:grpSpPr>
+        <a:xfrm>
+          <a:off x="0" y="0"/>
+          <a:ext cx="0" cy="0"/>
+          <a:chOff x="0" y="0"/>
+          <a:chExt cx="0" cy="0"/>
+        </a:xfrm>
+      </p:grpSpPr>
+      <p:sp>
+        <p:nvSpPr>
+          <p:cNvPr id="61" name="Google Shape;61;g3bc3b886ea_0_1:notes"/>
+          <p:cNvSpPr>
+            <a:spLocks noGrp="1" noRot="1" noChangeAspect="1"/>
+          </p:cNvSpPr>
+          <p:nvPr>
+            <p:ph type="sldImg" idx="2"/>
+          </p:nvPr>
+        </p:nvSpPr>
+        <p:spPr>
+          <a:xfrm>
+            <a:off x="381000" y="685800"/>
+            <a:ext cx="6096000" cy="3429000"/>
+          </a:xfrm>
+          <a:custGeom>
+            <a:avLst/>
+            <a:gdLst/>
+            <a:ahLst/>
+            <a:cxnLst/>
+            <a:rect l="l" t="t" r="r" b="b"/>
+            <a:pathLst>
+              <a:path w="120000" h="120000" extrusionOk="0">
+                <a:moveTo>
+                  <a:pt x="0" y="0"/>
+                </a:moveTo>
+                <a:lnTo>
+                  <a:pt x="120000" y="0"/>
+                </a:lnTo>
+                <a:lnTo>
+                  <a:pt x="120000" y="120000"/>
+                </a:lnTo>
+                <a:lnTo>
+                  <a:pt x="0" y="120000"/>
+                </a:lnTo>
+                <a:close/>
+              </a:path>
+            </a:pathLst>
+          </a:custGeom>
+        </p:spPr>
+      </p:sp>
+      <p:sp>
+        <p:nvSpPr>
+          <p:cNvPr id="62" name="Google Shape;62;g3bc3b886ea_0_1:notes"/>
+          <p:cNvSpPr txBox="1">
+            <a:spLocks noGrp="1"/>
+          </p:cNvSpPr>
+          <p:nvPr>
+            <p:ph type="body" idx="1"/>
+          </p:nvPr>
+        </p:nvSpPr>
+        <p:spPr>
+          <a:xfrm>
+            <a:off x="685800" y="4343400"/>
+            <a:ext cx="5486400" cy="4114800"/>
+          </a:xfrm>
+          <a:prstGeom prst="rect">
+            <a:avLst/>
+          </a:prstGeom>
+        </p:spPr>
+        <p:txBody>
+          <a:bodyPr spcFirstLastPara="1" wrap="square" lIns="91425" tIns="91425" rIns="91425" bIns="91425" anchor="t" anchorCtr="0">
+            <a:noAutofit/>
+          </a:bodyPr>
+          <a:lstStyle/>
+          <a:p>
+            <a:pPr marL="0" lvl="0" indent="0" algn="l" rtl="0">
+              <a:spcBef>
+                <a:spcPts val="0"/>
+              </a:spcBef>
+              <a:spcAft>
+                <a:spcPts val="0"/>
+              </a:spcAft>
+              <a:buNone/>
+            </a:pPr>
+            <a:endParaRPr/>
+          </a:p>
+        </p:txBody>
+      </p:sp>
+    </p:spTree>
+  </p:cSld>
+  <p:clrMapOvr>
+    <a:masterClrMapping/>
+  </p:clrMapOvr>
+</p:notes>
+</file>
+
+<file path=ppt/notesSlides/notesSlide17.xml><?xml version="1.0" encoding="utf-8"?>
 <p:notes xmlns:a="http://schemas.openxmlformats.org/drawingml/2006/main" xmlns:r="http://schemas.openxmlformats.org/officeDocument/2006/relationships" xmlns:p="http://schemas.openxmlformats.org/presentationml/2006/main" showMasterSp="0" showMasterPhAnim="0">
   <p:cSld>
     <p:spTree>
@@ -8442,6 +8547,206 @@
 <file path=ppt/slides/slide16.xml><?xml version="1.0" encoding="utf-8"?>
 <p:sld xmlns:a="http://schemas.openxmlformats.org/drawingml/2006/main" xmlns:r="http://schemas.openxmlformats.org/officeDocument/2006/relationships" xmlns:p="http://schemas.openxmlformats.org/presentationml/2006/main">
   <p:cSld>
+    <p:spTree>
+      <p:nvGrpSpPr>
+        <p:cNvPr id="1" name="Shape 63"/>
+        <p:cNvGrpSpPr/>
+        <p:nvPr/>
+      </p:nvGrpSpPr>
+      <p:grpSpPr>
+        <a:xfrm>
+          <a:off x="0" y="0"/>
+          <a:ext cx="0" cy="0"/>
+          <a:chOff x="0" y="0"/>
+          <a:chExt cx="0" cy="0"/>
+        </a:xfrm>
+      </p:grpSpPr>
+      <p:sp>
+        <p:nvSpPr>
+          <p:cNvPr id="64" name="Google Shape;64;p14"/>
+          <p:cNvSpPr/>
+          <p:nvPr/>
+        </p:nvSpPr>
+        <p:spPr>
+          <a:xfrm>
+            <a:off x="0" y="4764425"/>
+            <a:ext cx="9144300" cy="373200"/>
+          </a:xfrm>
+          <a:prstGeom prst="rect">
+            <a:avLst/>
+          </a:prstGeom>
+          <a:solidFill>
+            <a:srgbClr val="1F4352"/>
+          </a:solidFill>
+          <a:ln>
+            <a:noFill/>
+          </a:ln>
+        </p:spPr>
+        <p:txBody>
+          <a:bodyPr spcFirstLastPara="1" wrap="square" lIns="91425" tIns="91425" rIns="91425" bIns="91425" anchor="ctr" anchorCtr="0">
+            <a:noAutofit/>
+          </a:bodyPr>
+          <a:lstStyle/>
+          <a:p>
+            <a:pPr marL="0" lvl="0" indent="0" algn="l" rtl="0">
+              <a:spcBef>
+                <a:spcPts val="0"/>
+              </a:spcBef>
+              <a:spcAft>
+                <a:spcPts val="0"/>
+              </a:spcAft>
+              <a:buNone/>
+            </a:pPr>
+            <a:endParaRPr/>
+          </a:p>
+        </p:txBody>
+      </p:sp>
+      <p:pic>
+        <p:nvPicPr>
+          <p:cNvPr id="65" name="Google Shape;65;p14"/>
+          <p:cNvPicPr preferRelativeResize="0"/>
+          <p:nvPr/>
+        </p:nvPicPr>
+        <p:blipFill>
+          <a:blip r:embed="rId3">
+            <a:alphaModFix/>
+          </a:blip>
+          <a:stretch>
+            <a:fillRect/>
+          </a:stretch>
+        </p:blipFill>
+        <p:spPr>
+          <a:xfrm>
+            <a:off x="443527" y="4846129"/>
+            <a:ext cx="576901" cy="209780"/>
+          </a:xfrm>
+          <a:prstGeom prst="rect">
+            <a:avLst/>
+          </a:prstGeom>
+          <a:noFill/>
+          <a:ln>
+            <a:noFill/>
+          </a:ln>
+        </p:spPr>
+      </p:pic>
+      <p:sp>
+        <p:nvSpPr>
+          <p:cNvPr id="2" name="Rectangle 1"/>
+          <p:cNvSpPr/>
+          <p:nvPr/>
+        </p:nvSpPr>
+        <p:spPr>
+          <a:xfrm>
+            <a:off x="850360" y="470972"/>
+            <a:ext cx="7166098" cy="1384995"/>
+          </a:xfrm>
+          <a:prstGeom prst="rect">
+            <a:avLst/>
+          </a:prstGeom>
+        </p:spPr>
+        <p:txBody>
+          <a:bodyPr wrap="square">
+            <a:spAutoFit/>
+          </a:bodyPr>
+          <a:lstStyle/>
+          <a:p>
+            <a:r>
+              <a:rPr lang="fr-FR" dirty="0" smtClean="0">
+                <a:latin typeface="Times New Roman" panose="02020603050405020304" pitchFamily="18" charset="0"/>
+                <a:cs typeface="Times New Roman" panose="02020603050405020304" pitchFamily="18" charset="0"/>
+              </a:rPr>
+              <a:t>Selon le milieux sociaux professionnel les exigences ne sont pas les mêmes</a:t>
+            </a:r>
+            <a:r>
+              <a:rPr lang="fr-FR" dirty="0" smtClean="0">
+                <a:latin typeface="Times New Roman" panose="02020603050405020304" pitchFamily="18" charset="0"/>
+                <a:cs typeface="Times New Roman" panose="02020603050405020304" pitchFamily="18" charset="0"/>
+              </a:rPr>
+              <a:t>, par conséquent la chance de trouvé la bonne personne varie d’une profession à l’autre.</a:t>
+            </a:r>
+          </a:p>
+          <a:p>
+            <a:r>
+              <a:rPr lang="fr-FR" dirty="0" smtClean="0">
+                <a:latin typeface="Times New Roman" panose="02020603050405020304" pitchFamily="18" charset="0"/>
+                <a:cs typeface="Times New Roman" panose="02020603050405020304" pitchFamily="18" charset="0"/>
+              </a:rPr>
+              <a:t>On observe que chez les avocats, les médecins, et les psychologues le pourcentage de cœur brisé et de &lt;&lt;match&gt;&gt; est relativement équilibré au contrario des étudiants, de la finance et marketing ou il y’a plus de cœur brisé que de &lt;&lt;match&gt;&gt;.</a:t>
+            </a:r>
+          </a:p>
+          <a:p>
+            <a:endParaRPr lang="fr-FR" dirty="0" smtClean="0">
+              <a:latin typeface="Times New Roman" panose="02020603050405020304" pitchFamily="18" charset="0"/>
+              <a:cs typeface="Times New Roman" panose="02020603050405020304" pitchFamily="18" charset="0"/>
+            </a:endParaRPr>
+          </a:p>
+        </p:txBody>
+      </p:sp>
+      <p:pic>
+        <p:nvPicPr>
+          <p:cNvPr id="3" name="Image 2"/>
+          <p:cNvPicPr>
+            <a:picLocks noChangeAspect="1"/>
+          </p:cNvPicPr>
+          <p:nvPr/>
+        </p:nvPicPr>
+        <p:blipFill rotWithShape="1">
+          <a:blip r:embed="rId4">
+            <a:extLst>
+              <a:ext uri="{28A0092B-C50C-407E-A947-70E740481C1C}">
+                <a14:useLocalDpi xmlns:a14="http://schemas.microsoft.com/office/drawing/2010/main" val="0"/>
+              </a:ext>
+            </a:extLst>
+          </a:blip>
+          <a:srcRect r="35445"/>
+          <a:stretch/>
+        </p:blipFill>
+        <p:spPr>
+          <a:xfrm>
+            <a:off x="755576" y="1605280"/>
+            <a:ext cx="7888858" cy="2782659"/>
+          </a:xfrm>
+          <a:prstGeom prst="roundRect">
+            <a:avLst>
+              <a:gd name="adj" fmla="val 8594"/>
+            </a:avLst>
+          </a:prstGeom>
+          <a:solidFill>
+            <a:srgbClr val="FFFFFF">
+              <a:shade val="85000"/>
+            </a:srgbClr>
+          </a:solidFill>
+          <a:ln>
+            <a:noFill/>
+          </a:ln>
+          <a:effectLst>
+            <a:reflection blurRad="12700" stA="38000" endPos="28000" dist="5000" dir="5400000" sy="-100000" algn="bl" rotWithShape="0"/>
+          </a:effectLst>
+        </p:spPr>
+      </p:pic>
+    </p:spTree>
+    <p:extLst>
+      <p:ext uri="{BB962C8B-B14F-4D97-AF65-F5344CB8AC3E}">
+        <p14:creationId xmlns:p14="http://schemas.microsoft.com/office/powerpoint/2010/main" val="724940307"/>
+      </p:ext>
+    </p:extLst>
+  </p:cSld>
+  <p:clrMapOvr>
+    <a:masterClrMapping/>
+  </p:clrMapOvr>
+  <p:timing>
+    <p:tnLst>
+      <p:par>
+        <p:cTn id="1" dur="indefinite" restart="never" nodeType="tmRoot"/>
+      </p:par>
+    </p:tnLst>
+  </p:timing>
+</p:sld>
+</file>
+
+<file path=ppt/slides/slide17.xml><?xml version="1.0" encoding="utf-8"?>
+<p:sld xmlns:a="http://schemas.openxmlformats.org/drawingml/2006/main" xmlns:r="http://schemas.openxmlformats.org/officeDocument/2006/relationships" xmlns:p="http://schemas.openxmlformats.org/presentationml/2006/main">
+  <p:cSld>
     <p:bg>
       <p:bgPr>
         <a:solidFill>
@@ -8464,46 +8769,49 @@
           <a:chExt cx="0" cy="0"/>
         </a:xfrm>
       </p:grpSpPr>
-      <p:sp>
-        <p:nvSpPr>
-          <p:cNvPr id="84" name="Google Shape;84;p16"/>
-          <p:cNvSpPr/>
+      <p:pic>
+        <p:nvPicPr>
+          <p:cNvPr id="2" name="Image 1"/>
+          <p:cNvPicPr>
+            <a:picLocks noChangeAspect="1"/>
+          </p:cNvPicPr>
           <p:nvPr/>
-        </p:nvSpPr>
-        <p:spPr>
-          <a:xfrm>
-            <a:off x="387007" y="1729733"/>
-            <a:ext cx="533100" cy="533100"/>
-          </a:xfrm>
-          <a:prstGeom prst="ellipse">
-            <a:avLst/>
+        </p:nvPicPr>
+        <p:blipFill>
+          <a:blip r:embed="rId3">
+            <a:extLst>
+              <a:ext uri="{28A0092B-C50C-407E-A947-70E740481C1C}">
+                <a14:useLocalDpi xmlns:a14="http://schemas.microsoft.com/office/drawing/2010/main" val="0"/>
+              </a:ext>
+            </a:extLst>
+          </a:blip>
+          <a:stretch>
+            <a:fillRect/>
+          </a:stretch>
+        </p:blipFill>
+        <p:spPr>
+          <a:xfrm>
+            <a:off x="395536" y="339502"/>
+            <a:ext cx="8352928" cy="2376264"/>
+          </a:xfrm>
+          <a:prstGeom prst="roundRect">
+            <a:avLst>
+              <a:gd name="adj" fmla="val 8594"/>
+            </a:avLst>
           </a:prstGeom>
           <a:solidFill>
-            <a:srgbClr val="00DBD0"/>
+            <a:srgbClr val="FFFFFF">
+              <a:shade val="85000"/>
+            </a:srgbClr>
           </a:solidFill>
           <a:ln>
             <a:noFill/>
           </a:ln>
-        </p:spPr>
-        <p:txBody>
-          <a:bodyPr spcFirstLastPara="1" wrap="square" lIns="91425" tIns="91425" rIns="91425" bIns="91425" anchor="ctr" anchorCtr="0">
-            <a:noAutofit/>
-          </a:bodyPr>
-          <a:lstStyle/>
-          <a:p>
-            <a:pPr marL="0" lvl="0" indent="0" algn="l" rtl="0">
-              <a:spcBef>
-                <a:spcPts val="0"/>
-              </a:spcBef>
-              <a:spcAft>
-                <a:spcPts val="0"/>
-              </a:spcAft>
-              <a:buNone/>
-            </a:pPr>
-            <a:endParaRPr/>
-          </a:p>
-        </p:txBody>
-      </p:sp>
+          <a:effectLst>
+            <a:reflection blurRad="12700" stA="38000" endPos="28000" dist="5000" dir="5400000" sy="-100000" algn="bl" rotWithShape="0"/>
+          </a:effectLst>
+        </p:spPr>
+      </p:pic>
       <p:sp>
         <p:nvSpPr>
           <p:cNvPr id="85" name="Google Shape;85;p16"/>
@@ -8516,8 +8824,8 @@
         </p:nvSpPr>
         <p:spPr>
           <a:xfrm>
-            <a:off x="1040272" y="1398700"/>
-            <a:ext cx="5315100" cy="1398600"/>
+            <a:off x="626317" y="2789932"/>
+            <a:ext cx="6912367" cy="2169766"/>
           </a:xfrm>
           <a:prstGeom prst="rect">
             <a:avLst/>
@@ -8529,102 +8837,113 @@
           </a:bodyPr>
           <a:lstStyle/>
           <a:p>
-            <a:pPr marL="0" lvl="0" indent="0" algn="l" rtl="0">
-              <a:spcBef>
-                <a:spcPts val="0"/>
-              </a:spcBef>
-              <a:spcAft>
-                <a:spcPts val="0"/>
-              </a:spcAft>
-              <a:buNone/>
-            </a:pPr>
-            <a:r>
-              <a:rPr lang="fr" sz="3500" b="1" dirty="0">
+            <a:pPr algn="l"/>
+            <a:r>
+              <a:rPr lang="fr-FR" sz="1400" b="0" dirty="0" smtClean="0">
                 <a:solidFill>
-                  <a:schemeClr val="accent2">
-                    <a:lumMod val="60000"/>
-                    <a:lumOff val="40000"/>
-                  </a:schemeClr>
+                  <a:srgbClr val="1D1C1D"/>
                 </a:solidFill>
-                <a:latin typeface="Montserrat"/>
-                <a:ea typeface="Montserrat"/>
-                <a:cs typeface="Montserrat"/>
-                <a:sym typeface="Montserrat"/>
-              </a:rPr>
-              <a:t>Data Science Bootcamp</a:t>
-            </a:r>
-            <a:endParaRPr sz="3500" b="1" dirty="0">
+                <a:effectLst/>
+                <a:latin typeface="Times New Roman" panose="02020603050405020304" pitchFamily="18" charset="0"/>
+                <a:cs typeface="Times New Roman" panose="02020603050405020304" pitchFamily="18" charset="0"/>
+              </a:rPr>
+              <a:t>L'amour est loin d'être une science exacte, mais nous avons pu remarquer que certains facteurs pouvaient jouer en votre faveur.</a:t>
+            </a:r>
+            <a:br>
+              <a:rPr lang="fr-FR" sz="1400" b="0" dirty="0" smtClean="0">
+                <a:solidFill>
+                  <a:srgbClr val="1D1C1D"/>
+                </a:solidFill>
+                <a:effectLst/>
+                <a:latin typeface="Times New Roman" panose="02020603050405020304" pitchFamily="18" charset="0"/>
+                <a:cs typeface="Times New Roman" panose="02020603050405020304" pitchFamily="18" charset="0"/>
+              </a:rPr>
+            </a:br>
+            <a:r>
+              <a:rPr lang="fr-FR" sz="1400" b="0" dirty="0" smtClean="0">
+                <a:solidFill>
+                  <a:srgbClr val="1D1C1D"/>
+                </a:solidFill>
+                <a:effectLst/>
+                <a:latin typeface="Times New Roman" panose="02020603050405020304" pitchFamily="18" charset="0"/>
+                <a:cs typeface="Times New Roman" panose="02020603050405020304" pitchFamily="18" charset="0"/>
+              </a:rPr>
+              <a:t>En effet, il est préférable de ne pas trop prendre les évènements de Speed </a:t>
+            </a:r>
+            <a:r>
+              <a:rPr lang="fr-FR" sz="1400" b="0" dirty="0" err="1" smtClean="0">
+                <a:solidFill>
+                  <a:srgbClr val="1D1C1D"/>
+                </a:solidFill>
+                <a:effectLst/>
+                <a:latin typeface="Times New Roman" panose="02020603050405020304" pitchFamily="18" charset="0"/>
+                <a:cs typeface="Times New Roman" panose="02020603050405020304" pitchFamily="18" charset="0"/>
+              </a:rPr>
+              <a:t>Dating</a:t>
+            </a:r>
+            <a:r>
+              <a:rPr lang="fr-FR" sz="1400" b="0" dirty="0" smtClean="0">
+                <a:solidFill>
+                  <a:srgbClr val="1D1C1D"/>
+                </a:solidFill>
+                <a:effectLst/>
+                <a:latin typeface="Times New Roman" panose="02020603050405020304" pitchFamily="18" charset="0"/>
+                <a:cs typeface="Times New Roman" panose="02020603050405020304" pitchFamily="18" charset="0"/>
+              </a:rPr>
+              <a:t> au sérieux afin d'être plus naturel lors des rdv et de maximiser ses chances de match. De plus, nous avons également remarquer que les matchs augmentent avec la fréquence des dates, plus vous en ferez, plus vous aurez de chance de match.</a:t>
+            </a:r>
+            <a:br>
+              <a:rPr lang="fr-FR" sz="1400" b="0" dirty="0" smtClean="0">
+                <a:solidFill>
+                  <a:srgbClr val="1D1C1D"/>
+                </a:solidFill>
+                <a:effectLst/>
+                <a:latin typeface="Times New Roman" panose="02020603050405020304" pitchFamily="18" charset="0"/>
+                <a:cs typeface="Times New Roman" panose="02020603050405020304" pitchFamily="18" charset="0"/>
+              </a:rPr>
+            </a:br>
+            <a:r>
+              <a:rPr lang="fr-FR" sz="1400" b="0" dirty="0" smtClean="0">
+                <a:solidFill>
+                  <a:srgbClr val="1D1C1D"/>
+                </a:solidFill>
+                <a:effectLst/>
+                <a:latin typeface="Times New Roman" panose="02020603050405020304" pitchFamily="18" charset="0"/>
+                <a:cs typeface="Times New Roman" panose="02020603050405020304" pitchFamily="18" charset="0"/>
+              </a:rPr>
+              <a:t>Enfin, si vous ne savez pas où l'amener, nous avons démontrer que les sorties au cinéma ou bien un diner étaient des sorties appréciées de tous.</a:t>
+            </a:r>
+            <a:r>
+              <a:rPr lang="fr-FR" sz="1400" b="0" dirty="0">
+                <a:solidFill>
+                  <a:srgbClr val="1D1C1D"/>
+                </a:solidFill>
+                <a:effectLst/>
+                <a:latin typeface="Times New Roman" panose="02020603050405020304" pitchFamily="18" charset="0"/>
+                <a:cs typeface="Times New Roman" panose="02020603050405020304" pitchFamily="18" charset="0"/>
+              </a:rPr>
+              <a:t/>
+            </a:r>
+            <a:br>
+              <a:rPr lang="fr-FR" sz="1400" b="0" dirty="0">
+                <a:solidFill>
+                  <a:srgbClr val="1D1C1D"/>
+                </a:solidFill>
+                <a:effectLst/>
+                <a:latin typeface="Times New Roman" panose="02020603050405020304" pitchFamily="18" charset="0"/>
+                <a:cs typeface="Times New Roman" panose="02020603050405020304" pitchFamily="18" charset="0"/>
+              </a:rPr>
+            </a:br>
+            <a:endParaRPr sz="1400" b="1" dirty="0">
               <a:solidFill>
                 <a:schemeClr val="accent2">
                   <a:lumMod val="60000"/>
                   <a:lumOff val="40000"/>
                 </a:schemeClr>
               </a:solidFill>
-              <a:latin typeface="Montserrat"/>
+              <a:latin typeface="Times New Roman" panose="02020603050405020304" pitchFamily="18" charset="0"/>
               <a:ea typeface="Montserrat"/>
-              <a:cs typeface="Montserrat"/>
-              <a:sym typeface="Montserrat"/>
-            </a:endParaRPr>
-          </a:p>
-        </p:txBody>
-      </p:sp>
-      <p:sp>
-        <p:nvSpPr>
-          <p:cNvPr id="86" name="Google Shape;86;p16"/>
-          <p:cNvSpPr txBox="1">
-            <a:spLocks noGrp="1"/>
-          </p:cNvSpPr>
-          <p:nvPr>
-            <p:ph type="ctrTitle" idx="4294967295"/>
-          </p:nvPr>
-        </p:nvSpPr>
-        <p:spPr>
-          <a:xfrm>
-            <a:off x="920107" y="3138300"/>
-            <a:ext cx="5314950" cy="533400"/>
-          </a:xfrm>
-          <a:prstGeom prst="rect">
-            <a:avLst/>
-          </a:prstGeom>
-        </p:spPr>
-        <p:txBody>
-          <a:bodyPr spcFirstLastPara="1" wrap="square" lIns="91425" tIns="91425" rIns="91425" bIns="91425" anchor="b" anchorCtr="0">
-            <a:noAutofit/>
-          </a:bodyPr>
-          <a:lstStyle/>
-          <a:p>
-            <a:pPr marL="0" lvl="0" indent="0" algn="l" rtl="0">
-              <a:spcBef>
-                <a:spcPts val="0"/>
-              </a:spcBef>
-              <a:spcAft>
-                <a:spcPts val="0"/>
-              </a:spcAft>
-              <a:buNone/>
-            </a:pPr>
-            <a:r>
-              <a:rPr lang="fr" sz="2500" b="1" dirty="0">
-                <a:solidFill>
-                  <a:schemeClr val="bg1">
-                    <a:lumMod val="50000"/>
-                  </a:schemeClr>
-                </a:solidFill>
-                <a:latin typeface="Montserrat"/>
-                <a:ea typeface="Montserrat"/>
-                <a:cs typeface="Montserrat"/>
-                <a:sym typeface="Montserrat"/>
-              </a:rPr>
-              <a:t>Des questions ?</a:t>
-            </a:r>
-            <a:endParaRPr sz="2500" b="1" dirty="0">
-              <a:solidFill>
-                <a:schemeClr val="bg1">
-                  <a:lumMod val="50000"/>
-                </a:schemeClr>
-              </a:solidFill>
-              <a:latin typeface="Montserrat"/>
-              <a:ea typeface="Montserrat"/>
-              <a:cs typeface="Montserrat"/>
+              <a:cs typeface="Times New Roman" panose="02020603050405020304" pitchFamily="18" charset="0"/>
               <a:sym typeface="Montserrat"/>
             </a:endParaRPr>
           </a:p>
@@ -8663,7 +8982,7 @@
           <p:nvPr/>
         </p:nvPicPr>
         <p:blipFill>
-          <a:blip r:embed="rId3">
+          <a:blip r:embed="rId4">
             <a:alphaModFix/>
           </a:blip>
           <a:stretch>

</xml_diff>

<commit_message>
updated to last version (version finale) of ppt
</commit_message>
<xml_diff>
--- a/Rendu/Speed-dating.pptx
+++ b/Rendu/Speed-dating.pptx
@@ -7148,112 +7148,14 @@
           </a:prstGeom>
         </p:spPr>
         <p:style>
-          <a:lnRef idx="2">
-            <a:schemeClr val="accent3">
-              <a:shade val="50000"/>
-            </a:schemeClr>
+          <a:lnRef idx="1">
+            <a:schemeClr val="accent2"/>
           </a:lnRef>
-          <a:fillRef idx="1">
-            <a:schemeClr val="accent3"/>
-          </a:fillRef>
-          <a:effectRef idx="0">
-            <a:schemeClr val="accent3"/>
-          </a:effectRef>
-          <a:fontRef idx="minor">
-            <a:schemeClr val="lt1"/>
-          </a:fontRef>
-        </p:style>
-        <p:txBody>
-          <a:bodyPr rtlCol="0" anchor="ctr"/>
-          <a:lstStyle/>
-          <a:p>
-            <a:pPr algn="ctr"/>
-            <a:r>
-              <a:rPr lang="fr-FR" sz="1200" b="1" dirty="0" smtClean="0">
-                <a:latin typeface="Times New Roman" panose="02020603050405020304" pitchFamily="18" charset="0"/>
-                <a:cs typeface="Times New Roman" panose="02020603050405020304" pitchFamily="18" charset="0"/>
-              </a:rPr>
-              <a:t>ATTRACTIVE</a:t>
-            </a:r>
-            <a:endParaRPr lang="fr-FR" sz="1200" b="1" dirty="0">
-              <a:latin typeface="Times New Roman" panose="02020603050405020304" pitchFamily="18" charset="0"/>
-              <a:cs typeface="Times New Roman" panose="02020603050405020304" pitchFamily="18" charset="0"/>
-            </a:endParaRPr>
-          </a:p>
-        </p:txBody>
-      </p:sp>
-      <p:sp>
-        <p:nvSpPr>
-          <p:cNvPr id="9" name="Organigramme : Connecteur 8"/>
-          <p:cNvSpPr/>
-          <p:nvPr/>
-        </p:nvSpPr>
-        <p:spPr>
-          <a:xfrm>
-            <a:off x="2483768" y="3075806"/>
-            <a:ext cx="1584176" cy="1279158"/>
-          </a:xfrm>
-          <a:prstGeom prst="flowChartConnector">
-            <a:avLst/>
-          </a:prstGeom>
-        </p:spPr>
-        <p:style>
-          <a:lnRef idx="3">
-            <a:schemeClr val="lt1"/>
-          </a:lnRef>
-          <a:fillRef idx="1">
-            <a:schemeClr val="accent3"/>
+          <a:fillRef idx="2">
+            <a:schemeClr val="accent2"/>
           </a:fillRef>
           <a:effectRef idx="1">
-            <a:schemeClr val="accent3"/>
-          </a:effectRef>
-          <a:fontRef idx="minor">
-            <a:schemeClr val="lt1"/>
-          </a:fontRef>
-        </p:style>
-        <p:txBody>
-          <a:bodyPr rtlCol="0" anchor="ctr"/>
-          <a:lstStyle/>
-          <a:p>
-            <a:pPr algn="ctr"/>
-            <a:r>
-              <a:rPr lang="fr-FR" b="1" dirty="0" smtClean="0">
-                <a:latin typeface="Times New Roman" panose="02020603050405020304" pitchFamily="18" charset="0"/>
-                <a:cs typeface="Times New Roman" panose="02020603050405020304" pitchFamily="18" charset="0"/>
-              </a:rPr>
-              <a:t>FUN</a:t>
-            </a:r>
-            <a:endParaRPr lang="fr-FR" b="1" dirty="0">
-              <a:latin typeface="Times New Roman" panose="02020603050405020304" pitchFamily="18" charset="0"/>
-              <a:cs typeface="Times New Roman" panose="02020603050405020304" pitchFamily="18" charset="0"/>
-            </a:endParaRPr>
-          </a:p>
-        </p:txBody>
-      </p:sp>
-      <p:sp>
-        <p:nvSpPr>
-          <p:cNvPr id="10" name="Organigramme : Connecteur 9"/>
-          <p:cNvSpPr/>
-          <p:nvPr/>
-        </p:nvSpPr>
-        <p:spPr>
-          <a:xfrm>
-            <a:off x="3491880" y="1347614"/>
-            <a:ext cx="2412268" cy="2162722"/>
-          </a:xfrm>
-          <a:prstGeom prst="flowChartConnector">
-            <a:avLst/>
-          </a:prstGeom>
-        </p:spPr>
-        <p:style>
-          <a:lnRef idx="2">
-            <a:schemeClr val="accent6"/>
-          </a:lnRef>
-          <a:fillRef idx="1">
-            <a:schemeClr val="lt1"/>
-          </a:fillRef>
-          <a:effectRef idx="0">
-            <a:schemeClr val="accent6"/>
+            <a:schemeClr val="accent2"/>
           </a:effectRef>
           <a:fontRef idx="minor">
             <a:schemeClr val="dk1"/>
@@ -7269,7 +7171,7 @@
                 <a:latin typeface="Times New Roman" panose="02020603050405020304" pitchFamily="18" charset="0"/>
                 <a:cs typeface="Times New Roman" panose="02020603050405020304" pitchFamily="18" charset="0"/>
               </a:rPr>
-              <a:t>INTELLIGENT</a:t>
+              <a:t>ATTRACTIVE</a:t>
             </a:r>
             <a:endParaRPr lang="fr-FR" sz="1200" b="1" dirty="0">
               <a:latin typeface="Times New Roman" panose="02020603050405020304" pitchFamily="18" charset="0"/>
@@ -7280,6 +7182,102 @@
       </p:sp>
       <p:sp>
         <p:nvSpPr>
+          <p:cNvPr id="9" name="Organigramme : Connecteur 8"/>
+          <p:cNvSpPr/>
+          <p:nvPr/>
+        </p:nvSpPr>
+        <p:spPr>
+          <a:xfrm>
+            <a:off x="2483768" y="3075806"/>
+            <a:ext cx="1584176" cy="1279158"/>
+          </a:xfrm>
+          <a:prstGeom prst="flowChartConnector">
+            <a:avLst/>
+          </a:prstGeom>
+        </p:spPr>
+        <p:style>
+          <a:lnRef idx="1">
+            <a:schemeClr val="accent2"/>
+          </a:lnRef>
+          <a:fillRef idx="2">
+            <a:schemeClr val="accent2"/>
+          </a:fillRef>
+          <a:effectRef idx="1">
+            <a:schemeClr val="accent2"/>
+          </a:effectRef>
+          <a:fontRef idx="minor">
+            <a:schemeClr val="dk1"/>
+          </a:fontRef>
+        </p:style>
+        <p:txBody>
+          <a:bodyPr rtlCol="0" anchor="ctr"/>
+          <a:lstStyle/>
+          <a:p>
+            <a:pPr algn="ctr"/>
+            <a:r>
+              <a:rPr lang="fr-FR" b="1" dirty="0" smtClean="0">
+                <a:latin typeface="Times New Roman" panose="02020603050405020304" pitchFamily="18" charset="0"/>
+                <a:cs typeface="Times New Roman" panose="02020603050405020304" pitchFamily="18" charset="0"/>
+              </a:rPr>
+              <a:t>FUN</a:t>
+            </a:r>
+            <a:endParaRPr lang="fr-FR" b="1" dirty="0">
+              <a:latin typeface="Times New Roman" panose="02020603050405020304" pitchFamily="18" charset="0"/>
+              <a:cs typeface="Times New Roman" panose="02020603050405020304" pitchFamily="18" charset="0"/>
+            </a:endParaRPr>
+          </a:p>
+        </p:txBody>
+      </p:sp>
+      <p:sp>
+        <p:nvSpPr>
+          <p:cNvPr id="10" name="Organigramme : Connecteur 9"/>
+          <p:cNvSpPr/>
+          <p:nvPr/>
+        </p:nvSpPr>
+        <p:spPr>
+          <a:xfrm>
+            <a:off x="3491880" y="1347614"/>
+            <a:ext cx="2412268" cy="2162722"/>
+          </a:xfrm>
+          <a:prstGeom prst="flowChartConnector">
+            <a:avLst/>
+          </a:prstGeom>
+        </p:spPr>
+        <p:style>
+          <a:lnRef idx="1">
+            <a:schemeClr val="accent2"/>
+          </a:lnRef>
+          <a:fillRef idx="2">
+            <a:schemeClr val="accent2"/>
+          </a:fillRef>
+          <a:effectRef idx="1">
+            <a:schemeClr val="accent2"/>
+          </a:effectRef>
+          <a:fontRef idx="minor">
+            <a:schemeClr val="dk1"/>
+          </a:fontRef>
+        </p:style>
+        <p:txBody>
+          <a:bodyPr rtlCol="0" anchor="ctr"/>
+          <a:lstStyle/>
+          <a:p>
+            <a:pPr algn="ctr"/>
+            <a:r>
+              <a:rPr lang="fr-FR" sz="1200" b="1" dirty="0" smtClean="0">
+                <a:latin typeface="Times New Roman" panose="02020603050405020304" pitchFamily="18" charset="0"/>
+                <a:cs typeface="Times New Roman" panose="02020603050405020304" pitchFamily="18" charset="0"/>
+              </a:rPr>
+              <a:t>INTELLIGENT</a:t>
+            </a:r>
+            <a:endParaRPr lang="fr-FR" sz="1200" b="1" dirty="0">
+              <a:latin typeface="Times New Roman" panose="02020603050405020304" pitchFamily="18" charset="0"/>
+              <a:cs typeface="Times New Roman" panose="02020603050405020304" pitchFamily="18" charset="0"/>
+            </a:endParaRPr>
+          </a:p>
+        </p:txBody>
+      </p:sp>
+      <p:sp>
+        <p:nvSpPr>
           <p:cNvPr id="11" name="Organigramme : Connecteur 10"/>
           <p:cNvSpPr/>
           <p:nvPr/>
@@ -7294,17 +7292,17 @@
           </a:prstGeom>
         </p:spPr>
         <p:style>
-          <a:lnRef idx="3">
-            <a:schemeClr val="lt1"/>
+          <a:lnRef idx="1">
+            <a:schemeClr val="accent2"/>
           </a:lnRef>
-          <a:fillRef idx="1">
-            <a:schemeClr val="dk1"/>
+          <a:fillRef idx="2">
+            <a:schemeClr val="accent2"/>
           </a:fillRef>
           <a:effectRef idx="1">
-            <a:schemeClr val="dk1"/>
+            <a:schemeClr val="accent2"/>
           </a:effectRef>
           <a:fontRef idx="minor">
-            <a:schemeClr val="lt1"/>
+            <a:schemeClr val="dk1"/>
           </a:fontRef>
         </p:style>
         <p:txBody>
@@ -7342,17 +7340,17 @@
           </a:prstGeom>
         </p:spPr>
         <p:style>
-          <a:lnRef idx="0">
-            <a:schemeClr val="accent3"/>
+          <a:lnRef idx="1">
+            <a:schemeClr val="accent2"/>
           </a:lnRef>
-          <a:fillRef idx="3">
-            <a:schemeClr val="accent3"/>
+          <a:fillRef idx="2">
+            <a:schemeClr val="accent2"/>
           </a:fillRef>
-          <a:effectRef idx="3">
-            <a:schemeClr val="accent3"/>
+          <a:effectRef idx="1">
+            <a:schemeClr val="accent2"/>
           </a:effectRef>
           <a:fontRef idx="minor">
-            <a:schemeClr val="lt1"/>
+            <a:schemeClr val="dk1"/>
           </a:fontRef>
         </p:style>
         <p:txBody>
@@ -7419,17 +7417,17 @@
           </a:prstGeom>
         </p:spPr>
         <p:style>
-          <a:lnRef idx="3">
-            <a:schemeClr val="lt1"/>
+          <a:lnRef idx="1">
+            <a:schemeClr val="accent2"/>
           </a:lnRef>
-          <a:fillRef idx="1">
-            <a:schemeClr val="dk1"/>
+          <a:fillRef idx="2">
+            <a:schemeClr val="accent2"/>
           </a:fillRef>
           <a:effectRef idx="1">
-            <a:schemeClr val="dk1"/>
+            <a:schemeClr val="accent2"/>
           </a:effectRef>
           <a:fontRef idx="minor">
-            <a:schemeClr val="lt1"/>
+            <a:schemeClr val="dk1"/>
           </a:fontRef>
         </p:style>
         <p:txBody>
@@ -9308,7 +9306,7 @@
         </p:nvSpPr>
         <p:spPr>
           <a:xfrm>
-            <a:off x="2210336" y="199261"/>
+            <a:off x="2267744" y="339502"/>
             <a:ext cx="3888432" cy="720080"/>
           </a:xfrm>
           <a:prstGeom prst="rect">
@@ -9404,7 +9402,7 @@
         </p:nvSpPr>
         <p:spPr>
           <a:xfrm>
-            <a:off x="323528" y="411511"/>
+            <a:off x="251520" y="767482"/>
             <a:ext cx="1800200" cy="2308324"/>
           </a:xfrm>
           <a:prstGeom prst="rect">
@@ -9474,7 +9472,7 @@
         </p:nvSpPr>
         <p:spPr>
           <a:xfrm>
-            <a:off x="2273176" y="696367"/>
+            <a:off x="2273176" y="824974"/>
             <a:ext cx="6115248" cy="738664"/>
           </a:xfrm>
           <a:prstGeom prst="rect">
@@ -9573,18 +9571,25 @@
         </p:blipFill>
         <p:spPr bwMode="auto">
           <a:xfrm>
-            <a:off x="4043680" y="1481161"/>
-            <a:ext cx="3765312" cy="2072003"/>
-          </a:xfrm>
-          <a:prstGeom prst="rect">
-            <a:avLst/>
-          </a:prstGeom>
-          <a:noFill/>
+            <a:off x="3563888" y="1677444"/>
+            <a:ext cx="4896544" cy="2694506"/>
+          </a:xfrm>
+          <a:prstGeom prst="roundRect">
+            <a:avLst>
+              <a:gd name="adj" fmla="val 8594"/>
+            </a:avLst>
+          </a:prstGeom>
+          <a:solidFill>
+            <a:srgbClr val="FFFFFF">
+              <a:shade val="85000"/>
+            </a:srgbClr>
+          </a:solidFill>
           <a:ln>
-            <a:solidFill>
-              <a:srgbClr val="FFFF00"/>
-            </a:solidFill>
+            <a:noFill/>
           </a:ln>
+          <a:effectLst>
+            <a:reflection blurRad="12700" stA="38000" endPos="28000" dist="5000" dir="5400000" sy="-100000" algn="bl" rotWithShape="0"/>
+          </a:effectLst>
           <a:extLst>
             <a:ext uri="{909E8E84-426E-40DD-AFC4-6F175D3DCCD1}">
               <a14:hiddenFill xmlns:a14="http://schemas.microsoft.com/office/drawing/2010/main">
@@ -10032,64 +10037,6 @@
       </p:grpSpPr>
       <p:sp>
         <p:nvSpPr>
-          <p:cNvPr id="71" name="Google Shape;71;p15"/>
-          <p:cNvSpPr txBox="1">
-            <a:spLocks noGrp="1"/>
-          </p:cNvSpPr>
-          <p:nvPr>
-            <p:ph type="title"/>
-          </p:nvPr>
-        </p:nvSpPr>
-        <p:spPr>
-          <a:xfrm>
-            <a:off x="443514" y="403309"/>
-            <a:ext cx="4632542" cy="872297"/>
-          </a:xfrm>
-          <a:prstGeom prst="rect">
-            <a:avLst/>
-          </a:prstGeom>
-        </p:spPr>
-        <p:txBody>
-          <a:bodyPr spcFirstLastPara="1" wrap="square" lIns="91425" tIns="91425" rIns="91425" bIns="91425" anchor="t" anchorCtr="0">
-            <a:noAutofit/>
-          </a:bodyPr>
-          <a:lstStyle/>
-          <a:p>
-            <a:pPr marL="0" lvl="0" indent="0" rtl="0">
-              <a:spcBef>
-                <a:spcPts val="0"/>
-              </a:spcBef>
-              <a:spcAft>
-                <a:spcPts val="0"/>
-              </a:spcAft>
-              <a:buNone/>
-            </a:pPr>
-            <a:r>
-              <a:rPr lang="fr" sz="2500" b="0" dirty="0" smtClean="0">
-                <a:solidFill>
-                  <a:srgbClr val="1F4352"/>
-                </a:solidFill>
-                <a:latin typeface="Times New Roman" panose="02020603050405020304" pitchFamily="18" charset="0"/>
-                <a:ea typeface="Montserrat"/>
-                <a:cs typeface="Times New Roman" panose="02020603050405020304" pitchFamily="18" charset="0"/>
-                <a:sym typeface="Montserrat"/>
-              </a:rPr>
-              <a:t>Introduction</a:t>
-            </a:r>
-            <a:endParaRPr sz="2500" b="0" dirty="0">
-              <a:solidFill>
-                <a:srgbClr val="1F4352"/>
-              </a:solidFill>
-              <a:latin typeface="Times New Roman" panose="02020603050405020304" pitchFamily="18" charset="0"/>
-              <a:ea typeface="Montserrat"/>
-              <a:cs typeface="Times New Roman" panose="02020603050405020304" pitchFamily="18" charset="0"/>
-              <a:sym typeface="Montserrat"/>
-            </a:endParaRPr>
-          </a:p>
-        </p:txBody>
-      </p:sp>
-      <p:sp>
-        <p:nvSpPr>
           <p:cNvPr id="72" name="Google Shape;72;p15"/>
           <p:cNvSpPr/>
           <p:nvPr/>
@@ -11749,10 +11696,10 @@
             <a:schemeClr val="lt1"/>
           </a:lnRef>
           <a:fillRef idx="1">
-            <a:schemeClr val="dk1"/>
+            <a:schemeClr val="accent3"/>
           </a:fillRef>
           <a:effectRef idx="1">
-            <a:schemeClr val="dk1"/>
+            <a:schemeClr val="accent3"/>
           </a:effectRef>
           <a:fontRef idx="minor">
             <a:schemeClr val="lt1"/>
@@ -11870,14 +11817,14 @@
           </a:prstGeom>
         </p:spPr>
         <p:style>
-          <a:lnRef idx="3">
-            <a:schemeClr val="lt1"/>
+          <a:lnRef idx="1">
+            <a:schemeClr val="accent3"/>
           </a:lnRef>
-          <a:fillRef idx="1">
-            <a:schemeClr val="dk1"/>
+          <a:fillRef idx="3">
+            <a:schemeClr val="accent3"/>
           </a:fillRef>
-          <a:effectRef idx="1">
-            <a:schemeClr val="dk1"/>
+          <a:effectRef idx="2">
+            <a:schemeClr val="accent3"/>
           </a:effectRef>
           <a:fontRef idx="minor">
             <a:schemeClr val="lt1"/>

</xml_diff>